<commit_message>
Fixed most of the drift issues
All basic & some advanced gamepad controller keys are working. Few are still yet to tested and fix reminder of the issues to make the robot ready for field testing
</commit_message>
<xml_diff>
--- a/ProgrammingDocs/Gamepad_AT_2022_11292022.pptx
+++ b/ProgrammingDocs/Gamepad_AT_2022_11292022.pptx
@@ -248,7 +248,7 @@
       <p15:sldGuideLst xmlns:p15="http://schemas.microsoft.com/office/powerpoint/2012/main"/>
     </p:ext>
     <p:ext uri="http://customooxmlschemas.google.com/">
-      <go:slidesCustomData xmlns:go="http://customooxmlschemas.google.com/" xmlns:ahyp="http://schemas.microsoft.com/office/drawing/2018/hyperlinkcolor" xmlns:p15="http://schemas.microsoft.com/office/powerpoint/2012/main" xmlns:p14="http://schemas.microsoft.com/office/powerpoint/2010/main" xmlns:com="http://schemas.openxmlformats.org/drawingml/2006/compatibility" xmlns:pvml="urn:schemas-microsoft-com:office:powerpoint" xmlns:v="urn:schemas-microsoft-com:vml" xmlns:o="urn:schemas-microsoft-com:office:office" xmlns:dgm="http://schemas.openxmlformats.org/drawingml/2006/diagram" xmlns:c="http://schemas.openxmlformats.org/drawingml/2006/chart" xmlns:mv="urn:schemas-microsoft-com:mac:vml" xmlns:mc="http://schemas.openxmlformats.org/markup-compatibility/2006" xmlns="" r:id="rId9" roundtripDataSignature="AMtx7mg7/Uy38vozo7lv7lODiH/+yduhyA=="/>
+      <go:slidesCustomData xmlns="" xmlns:mc="http://schemas.openxmlformats.org/markup-compatibility/2006" xmlns:mv="urn:schemas-microsoft-com:mac:vml" xmlns:c="http://schemas.openxmlformats.org/drawingml/2006/chart" xmlns:dgm="http://schemas.openxmlformats.org/drawingml/2006/diagram" xmlns:o="urn:schemas-microsoft-com:office:office" xmlns:v="urn:schemas-microsoft-com:vml" xmlns:pvml="urn:schemas-microsoft-com:office:powerpoint" xmlns:com="http://schemas.openxmlformats.org/drawingml/2006/compatibility" xmlns:p14="http://schemas.microsoft.com/office/powerpoint/2010/main" xmlns:p15="http://schemas.microsoft.com/office/powerpoint/2012/main" xmlns:ahyp="http://schemas.microsoft.com/office/drawing/2018/hyperlinkcolor" xmlns:go="http://customooxmlschemas.google.com/" r:id="rId9" roundtripDataSignature="AMtx7mg7/Uy38vozo7lv7lODiH/+yduhyA=="/>
     </p:ext>
   </p:extLst>
 </p:presentation>
@@ -12799,7 +12799,7 @@
         <p:spPr>
           <a:xfrm>
             <a:off x="6152914" y="1217060"/>
-            <a:ext cx="5909723" cy="1985118"/>
+            <a:ext cx="5909723" cy="2646838"/>
           </a:xfrm>
           <a:prstGeom prst="rect">
             <a:avLst/>
@@ -12821,13 +12821,10 @@
           </a:bodyPr>
           <a:lstStyle/>
           <a:p>
-            <a:pPr marL="342900" marR="0" lvl="0" indent="-342900" algn="l" rtl="0">
-              <a:spcBef>
-                <a:spcPts val="0"/>
-              </a:spcBef>
-              <a:spcAft>
-                <a:spcPts val="0"/>
-              </a:spcAft>
+            <a:pPr marL="342900" lvl="0" indent="-342900">
+              <a:spcBef>
+                <a:spcPts val="600"/>
+              </a:spcBef>
               <a:buClr>
                 <a:srgbClr val="00B0F0"/>
               </a:buClr>
@@ -12835,42 +12832,6 @@
               <a:buFont typeface="Calibri"/>
               <a:buAutoNum type="arabicPeriod"/>
             </a:pPr>
-            <a:r>
-              <a:rPr lang="en-US" b="0" i="0" u="none" strike="noStrike" cap="none" dirty="0">
-                <a:solidFill>
-                  <a:srgbClr val="00B0F0"/>
-                </a:solidFill>
-                <a:latin typeface="Calibri"/>
-                <a:ea typeface="Calibri"/>
-                <a:cs typeface="Calibri"/>
-                <a:sym typeface="Calibri"/>
-              </a:rPr>
-              <a:t>Left Bumper, Right Bumper &amp; A is to </a:t>
-            </a:r>
-            <a:r>
-              <a:rPr lang="en-US" b="0" i="0" u="none" strike="noStrike" cap="none" dirty="0">
-                <a:solidFill>
-                  <a:srgbClr val="FF0000"/>
-                </a:solidFill>
-                <a:latin typeface="Calibri"/>
-                <a:ea typeface="Calibri"/>
-                <a:cs typeface="Calibri"/>
-                <a:sym typeface="Calibri"/>
-              </a:rPr>
-              <a:t>move robo</a:t>
-            </a:r>
-            <a:r>
-              <a:rPr lang="en-US" dirty="0">
-                <a:solidFill>
-                  <a:srgbClr val="FF0000"/>
-                </a:solidFill>
-                <a:latin typeface="Calibri"/>
-                <a:ea typeface="Calibri"/>
-                <a:cs typeface="Calibri"/>
-                <a:sym typeface="Calibri"/>
-              </a:rPr>
-              <a:t>t </a:t>
-            </a:r>
             <a:r>
               <a:rPr lang="en-US" dirty="0">
                 <a:solidFill>
@@ -12881,18 +12842,22 @@
                 <a:cs typeface="Calibri"/>
                 <a:sym typeface="Calibri"/>
               </a:rPr>
-              <a:t>into Substation Pickup (*** robot has to stay close to your alliance zone for auto positioning)</a:t>
+              <a:t>Left Bumper, Right Bumper &amp; A is to move robot into Substation Pickup (*** robot has to stay close to your alliance zone for auto positioning)</a:t>
             </a:r>
-            <a:endParaRPr sz="1200" dirty="0"/>
+            <a:endParaRPr dirty="0">
+              <a:solidFill>
+                <a:srgbClr val="00B0F0"/>
+              </a:solidFill>
+              <a:latin typeface="Calibri"/>
+              <a:ea typeface="Calibri"/>
+              <a:cs typeface="Calibri"/>
+            </a:endParaRPr>
           </a:p>
           <a:p>
-            <a:pPr marL="342900" marR="0" lvl="0" indent="-342900" algn="l" rtl="0">
+            <a:pPr marL="342900" lvl="0" indent="-342900">
               <a:spcBef>
                 <a:spcPts val="600"/>
               </a:spcBef>
-              <a:spcAft>
-                <a:spcPts val="0"/>
-              </a:spcAft>
               <a:buClr>
                 <a:srgbClr val="00B0F0"/>
               </a:buClr>
@@ -12900,18 +12865,6 @@
               <a:buFont typeface="Calibri"/>
               <a:buAutoNum type="arabicPeriod"/>
             </a:pPr>
-            <a:r>
-              <a:rPr lang="en-US" b="0" i="0" u="none" strike="noStrike" cap="none" dirty="0">
-                <a:solidFill>
-                  <a:srgbClr val="00B0F0"/>
-                </a:solidFill>
-                <a:latin typeface="Calibri"/>
-                <a:ea typeface="Calibri"/>
-                <a:cs typeface="Calibri"/>
-                <a:sym typeface="Calibri"/>
-              </a:rPr>
-              <a:t>Left Bumper, Right Bumper &amp; X is to stop both platform &amp; </a:t>
-            </a:r>
             <a:r>
               <a:rPr lang="en-US" dirty="0">
                 <a:solidFill>
@@ -12922,30 +12875,22 @@
                 <a:cs typeface="Calibri"/>
                 <a:sym typeface="Calibri"/>
               </a:rPr>
-              <a:t>T</a:t>
+              <a:t>Left Bumper, Right Bumper &amp; X is to stop both platform &amp; Tophat</a:t>
             </a:r>
-            <a:r>
-              <a:rPr lang="en-US" b="0" i="0" u="none" strike="noStrike" cap="none" dirty="0">
-                <a:solidFill>
-                  <a:srgbClr val="00B0F0"/>
-                </a:solidFill>
-                <a:latin typeface="Calibri"/>
-                <a:ea typeface="Calibri"/>
-                <a:cs typeface="Calibri"/>
-                <a:sym typeface="Calibri"/>
-              </a:rPr>
-              <a:t>ophat</a:t>
-            </a:r>
-            <a:endParaRPr lang="en-US" sz="1200" dirty="0"/>
+            <a:endParaRPr lang="en-US" dirty="0">
+              <a:solidFill>
+                <a:srgbClr val="00B0F0"/>
+              </a:solidFill>
+              <a:latin typeface="Calibri"/>
+              <a:ea typeface="Calibri"/>
+              <a:cs typeface="Calibri"/>
+            </a:endParaRPr>
           </a:p>
           <a:p>
-            <a:pPr marL="342900" marR="0" lvl="0" indent="-342900" algn="l" rtl="0">
+            <a:pPr marL="342900" lvl="0" indent="-342900">
               <a:spcBef>
                 <a:spcPts val="600"/>
               </a:spcBef>
-              <a:spcAft>
-                <a:spcPts val="0"/>
-              </a:spcAft>
               <a:buClr>
                 <a:srgbClr val="00B0F0"/>
               </a:buClr>
@@ -12954,7 +12899,7 @@
               <a:buAutoNum type="arabicPeriod"/>
             </a:pPr>
             <a:r>
-              <a:rPr lang="en-US" b="0" i="0" u="none" strike="noStrike" cap="none" dirty="0">
+              <a:rPr lang="en-US" dirty="0">
                 <a:solidFill>
                   <a:srgbClr val="00B0F0"/>
                 </a:solidFill>
@@ -12965,16 +12910,20 @@
               </a:rPr>
               <a:t>Left Stick X&amp;Y and Right Stick X is for Platform Navigation Manually</a:t>
             </a:r>
-            <a:endParaRPr lang="en-US" sz="1200" dirty="0"/>
+            <a:endParaRPr lang="en-US" dirty="0">
+              <a:solidFill>
+                <a:srgbClr val="00B0F0"/>
+              </a:solidFill>
+              <a:latin typeface="Calibri"/>
+              <a:ea typeface="Calibri"/>
+              <a:cs typeface="Calibri"/>
+            </a:endParaRPr>
           </a:p>
           <a:p>
-            <a:pPr marL="342900" marR="0" lvl="0" indent="-342900" algn="l" rtl="0">
+            <a:pPr marL="342900" lvl="0" indent="-342900">
               <a:spcBef>
                 <a:spcPts val="600"/>
               </a:spcBef>
-              <a:spcAft>
-                <a:spcPts val="0"/>
-              </a:spcAft>
               <a:buClr>
                 <a:srgbClr val="00B0F0"/>
               </a:buClr>
@@ -12983,7 +12932,7 @@
               <a:buAutoNum type="arabicPeriod"/>
             </a:pPr>
             <a:r>
-              <a:rPr lang="en-US" b="0" i="0" u="none" strike="noStrike" cap="none" dirty="0">
+              <a:rPr lang="en-US" dirty="0">
                 <a:solidFill>
                   <a:srgbClr val="00B0F0"/>
                 </a:solidFill>
@@ -12994,7 +12943,14 @@
               </a:rPr>
               <a:t>Left Bumper, Right Bumper, Left Trigger, Right Trigger &amp; X is Robot Reset</a:t>
             </a:r>
-            <a:endParaRPr lang="en-US" sz="1200" dirty="0"/>
+            <a:endParaRPr lang="en-US" dirty="0">
+              <a:solidFill>
+                <a:srgbClr val="00B0F0"/>
+              </a:solidFill>
+              <a:latin typeface="Calibri"/>
+              <a:ea typeface="Calibri"/>
+              <a:cs typeface="Calibri"/>
+            </a:endParaRPr>
           </a:p>
           <a:p>
             <a:pPr marL="342900" indent="-342900">
@@ -13034,7 +12990,7 @@
               <a:buAutoNum type="arabicPeriod"/>
             </a:pPr>
             <a:r>
-              <a:rPr lang="en-US" b="0" i="0" u="none" strike="noStrike" cap="none" dirty="0">
+              <a:rPr lang="en-US" dirty="0">
                 <a:solidFill>
                   <a:srgbClr val="00B0F0"/>
                 </a:solidFill>
@@ -13043,32 +12999,21 @@
                 <a:cs typeface="Calibri"/>
                 <a:sym typeface="Calibri"/>
               </a:rPr>
-              <a:t>Left Bumper, Right Bumper &amp; B is to </a:t>
+              <a:t>Left Bumper, Right Bumper &amp; B is to turn robot left into 180 degrees</a:t>
             </a:r>
-            <a:r>
-              <a:rPr lang="en-US" b="0" i="0" u="none" strike="noStrike" cap="none" dirty="0">
-                <a:solidFill>
-                  <a:srgbClr val="FF0000"/>
-                </a:solidFill>
-                <a:latin typeface="Calibri"/>
-                <a:ea typeface="Calibri"/>
-                <a:cs typeface="Calibri"/>
-                <a:sym typeface="Calibri"/>
-              </a:rPr>
-              <a:t>turn robo</a:t>
-            </a:r>
-            <a:r>
-              <a:rPr lang="en-US" dirty="0">
-                <a:solidFill>
-                  <a:srgbClr val="FF0000"/>
-                </a:solidFill>
-                <a:latin typeface="Calibri"/>
-                <a:ea typeface="Calibri"/>
-                <a:cs typeface="Calibri"/>
-                <a:sym typeface="Calibri"/>
-              </a:rPr>
-              <a:t>t left </a:t>
-            </a:r>
+          </a:p>
+          <a:p>
+            <a:pPr marL="342900" indent="-342900">
+              <a:spcBef>
+                <a:spcPts val="600"/>
+              </a:spcBef>
+              <a:buClr>
+                <a:srgbClr val="00B0F0"/>
+              </a:buClr>
+              <a:buSzPts val="1600"/>
+              <a:buFont typeface="Calibri"/>
+              <a:buAutoNum type="arabicPeriod"/>
+            </a:pPr>
             <a:r>
               <a:rPr lang="en-US" dirty="0">
                 <a:solidFill>
@@ -13079,7 +13024,32 @@
                 <a:cs typeface="Calibri"/>
                 <a:sym typeface="Calibri"/>
               </a:rPr>
-              <a:t>into 180 degrees</a:t>
+              <a:t>Left Trigger, Right Trigger &amp; DPADUP is to increase the Tophat Speed</a:t>
+            </a:r>
+          </a:p>
+          <a:p>
+            <a:pPr marL="342900" indent="-342900">
+              <a:spcBef>
+                <a:spcPts val="600"/>
+              </a:spcBef>
+              <a:buClr>
+                <a:srgbClr val="00B0F0"/>
+              </a:buClr>
+              <a:buSzPts val="1600"/>
+              <a:buFont typeface="Calibri"/>
+              <a:buAutoNum type="arabicPeriod"/>
+            </a:pPr>
+            <a:r>
+              <a:rPr lang="en-US" dirty="0">
+                <a:solidFill>
+                  <a:srgbClr val="00B0F0"/>
+                </a:solidFill>
+                <a:latin typeface="Calibri"/>
+                <a:ea typeface="Calibri"/>
+                <a:cs typeface="Calibri"/>
+                <a:sym typeface="Calibri"/>
+              </a:rPr>
+              <a:t>Left Trigger, Right Trigger &amp; DPADDOWN is to decrease the Tophat Speed</a:t>
             </a:r>
             <a:endParaRPr lang="en-US" dirty="0">
               <a:solidFill>
@@ -14339,7 +14309,7 @@
                 <a:cs typeface="Calibri"/>
                 <a:sym typeface="Calibri"/>
               </a:rPr>
-              <a:t>Instructions for Robot Top Hat Driver</a:t>
+              <a:t>Instructions for Robot Top Hat Driver - Basic</a:t>
             </a:r>
             <a:endParaRPr dirty="0"/>
           </a:p>
@@ -16354,7 +16324,7 @@
                 <a:cs typeface="Calibri"/>
                 <a:sym typeface="Calibri"/>
               </a:rPr>
-              <a:t>Instructions for Robot Top Hat Driver</a:t>
+              <a:t>Instructions for Robot Top Hat Driver -  Advanced</a:t>
             </a:r>
             <a:endParaRPr dirty="0"/>
           </a:p>
@@ -16682,8 +16652,8 @@
         </p:nvSpPr>
         <p:spPr>
           <a:xfrm>
-            <a:off x="6386402" y="1468667"/>
-            <a:ext cx="5469476" cy="3000781"/>
+            <a:off x="6386402" y="1127531"/>
+            <a:ext cx="5469476" cy="3216225"/>
           </a:xfrm>
           <a:prstGeom prst="rect">
             <a:avLst/>
@@ -16717,18 +16687,6 @@
               <a:buAutoNum type="arabicPeriod"/>
             </a:pPr>
             <a:r>
-              <a:rPr lang="en-US" b="0" i="0" u="none" strike="noStrike" cap="none" dirty="0">
-                <a:solidFill>
-                  <a:srgbClr val="00B0F0"/>
-                </a:solidFill>
-                <a:latin typeface="Calibri"/>
-                <a:ea typeface="Calibri"/>
-                <a:cs typeface="Calibri"/>
-                <a:sym typeface="Calibri"/>
-              </a:rPr>
-              <a:t>Left Trigger</a:t>
-            </a:r>
-            <a:r>
               <a:rPr lang="en-US" dirty="0">
                 <a:solidFill>
                   <a:srgbClr val="00B0F0"/>
@@ -16738,263 +16696,7 @@
                 <a:cs typeface="Calibri"/>
                 <a:sym typeface="Calibri"/>
               </a:rPr>
-              <a:t> </a:t>
-            </a:r>
-            <a:r>
-              <a:rPr lang="en-US" b="0" i="0" u="none" strike="noStrike" cap="none" dirty="0">
-                <a:solidFill>
-                  <a:srgbClr val="00B0F0"/>
-                </a:solidFill>
-                <a:latin typeface="Calibri"/>
-                <a:ea typeface="Calibri"/>
-                <a:cs typeface="Calibri"/>
-                <a:sym typeface="Calibri"/>
-              </a:rPr>
-              <a:t>&amp; X to </a:t>
-            </a:r>
-            <a:r>
-              <a:rPr lang="en-US" b="0" i="0" u="none" strike="noStrike" cap="none" dirty="0">
-                <a:solidFill>
-                  <a:srgbClr val="FF0000"/>
-                </a:solidFill>
-                <a:latin typeface="Calibri"/>
-                <a:ea typeface="Calibri"/>
-                <a:cs typeface="Calibri"/>
-                <a:sym typeface="Calibri"/>
-              </a:rPr>
-              <a:t>substation</a:t>
-            </a:r>
-            <a:r>
-              <a:rPr lang="en-US" b="0" i="0" u="none" strike="noStrike" cap="none" dirty="0">
-                <a:solidFill>
-                  <a:srgbClr val="00B0F0"/>
-                </a:solidFill>
-                <a:latin typeface="Calibri"/>
-                <a:ea typeface="Calibri"/>
-                <a:cs typeface="Calibri"/>
-                <a:sym typeface="Calibri"/>
-              </a:rPr>
-              <a:t> pickup to drop in High Junction</a:t>
-            </a:r>
-          </a:p>
-          <a:p>
-            <a:pPr marL="342900" indent="-342900">
-              <a:spcBef>
-                <a:spcPts val="600"/>
-              </a:spcBef>
-              <a:buClr>
-                <a:srgbClr val="00B0F0"/>
-              </a:buClr>
-              <a:buSzPts val="1400"/>
-              <a:buFont typeface="+mj-lt"/>
-              <a:buAutoNum type="arabicPeriod"/>
-            </a:pPr>
-            <a:r>
-              <a:rPr lang="en-US" b="0" i="0" u="none" strike="noStrike" cap="none" dirty="0">
-                <a:solidFill>
-                  <a:srgbClr val="00B0F0"/>
-                </a:solidFill>
-                <a:latin typeface="Calibri"/>
-                <a:ea typeface="Calibri"/>
-                <a:cs typeface="Calibri"/>
-                <a:sym typeface="Calibri"/>
-              </a:rPr>
-              <a:t>Right Trigger</a:t>
-            </a:r>
-            <a:r>
-              <a:rPr lang="en-US" dirty="0">
-                <a:solidFill>
-                  <a:srgbClr val="00B0F0"/>
-                </a:solidFill>
-                <a:latin typeface="Calibri"/>
-                <a:ea typeface="Calibri"/>
-                <a:cs typeface="Calibri"/>
-                <a:sym typeface="Calibri"/>
-              </a:rPr>
-              <a:t> </a:t>
-            </a:r>
-            <a:r>
-              <a:rPr lang="en-US" b="0" i="0" u="none" strike="noStrike" cap="none" dirty="0">
-                <a:solidFill>
-                  <a:srgbClr val="00B0F0"/>
-                </a:solidFill>
-                <a:latin typeface="Calibri"/>
-                <a:ea typeface="Calibri"/>
-                <a:cs typeface="Calibri"/>
-                <a:sym typeface="Calibri"/>
-              </a:rPr>
-              <a:t>&amp; X to </a:t>
-            </a:r>
-            <a:r>
-              <a:rPr lang="en-US" b="0" i="0" u="none" strike="noStrike" cap="none" dirty="0">
-                <a:solidFill>
-                  <a:srgbClr val="FF0000"/>
-                </a:solidFill>
-                <a:latin typeface="Calibri"/>
-                <a:ea typeface="Calibri"/>
-                <a:cs typeface="Calibri"/>
-                <a:sym typeface="Calibri"/>
-              </a:rPr>
-              <a:t>substation</a:t>
-            </a:r>
-            <a:r>
-              <a:rPr lang="en-US" b="0" i="0" u="none" strike="noStrike" cap="none" dirty="0">
-                <a:solidFill>
-                  <a:srgbClr val="00B0F0"/>
-                </a:solidFill>
-                <a:latin typeface="Calibri"/>
-                <a:ea typeface="Calibri"/>
-                <a:cs typeface="Calibri"/>
-                <a:sym typeface="Calibri"/>
-              </a:rPr>
-              <a:t> pickup to drop in Medium Junction</a:t>
-            </a:r>
-          </a:p>
-          <a:p>
-            <a:pPr marL="342900" indent="-342900">
-              <a:spcBef>
-                <a:spcPts val="600"/>
-              </a:spcBef>
-              <a:buClr>
-                <a:srgbClr val="00B0F0"/>
-              </a:buClr>
-              <a:buSzPts val="1400"/>
-              <a:buFont typeface="+mj-lt"/>
-              <a:buAutoNum type="arabicPeriod"/>
-            </a:pPr>
-            <a:r>
-              <a:rPr lang="en-US" b="0" i="0" u="none" strike="noStrike" cap="none" dirty="0">
-                <a:solidFill>
-                  <a:srgbClr val="00B0F0"/>
-                </a:solidFill>
-                <a:latin typeface="Calibri"/>
-                <a:ea typeface="Calibri"/>
-                <a:cs typeface="Calibri"/>
-                <a:sym typeface="Calibri"/>
-              </a:rPr>
-              <a:t>Left Trigger, Right Trigger &amp; X to </a:t>
-            </a:r>
-            <a:r>
-              <a:rPr lang="en-US" b="0" i="0" u="none" strike="noStrike" cap="none" dirty="0">
-                <a:solidFill>
-                  <a:srgbClr val="FF0000"/>
-                </a:solidFill>
-                <a:latin typeface="Calibri"/>
-                <a:ea typeface="Calibri"/>
-                <a:cs typeface="Calibri"/>
-                <a:sym typeface="Calibri"/>
-              </a:rPr>
-              <a:t>substation</a:t>
-            </a:r>
-            <a:r>
-              <a:rPr lang="en-US" b="0" i="0" u="none" strike="noStrike" cap="none" dirty="0">
-                <a:solidFill>
-                  <a:srgbClr val="00B0F0"/>
-                </a:solidFill>
-                <a:latin typeface="Calibri"/>
-                <a:ea typeface="Calibri"/>
-                <a:cs typeface="Calibri"/>
-                <a:sym typeface="Calibri"/>
-              </a:rPr>
-              <a:t> pickup and ready for Navigation</a:t>
-            </a:r>
-          </a:p>
-          <a:p>
-            <a:pPr marL="342900" indent="-342900">
-              <a:spcBef>
-                <a:spcPts val="600"/>
-              </a:spcBef>
-              <a:buClr>
-                <a:srgbClr val="00B0F0"/>
-              </a:buClr>
-              <a:buSzPts val="1400"/>
-              <a:buFont typeface="+mj-lt"/>
-              <a:buAutoNum type="arabicPeriod"/>
-            </a:pPr>
-            <a:r>
-              <a:rPr lang="en-US" b="0" i="0" u="none" strike="noStrike" cap="none" dirty="0">
-                <a:solidFill>
-                  <a:srgbClr val="00B0F0"/>
-                </a:solidFill>
-                <a:latin typeface="Calibri"/>
-                <a:ea typeface="Calibri"/>
-                <a:cs typeface="Calibri"/>
-                <a:sym typeface="Calibri"/>
-              </a:rPr>
-              <a:t>Left Trigger, Right Trigger &amp; Y to drop in high junction from </a:t>
-            </a:r>
-            <a:r>
-              <a:rPr lang="en-US" b="0" i="0" u="none" strike="noStrike" cap="none" dirty="0">
-                <a:solidFill>
-                  <a:srgbClr val="FF0000"/>
-                </a:solidFill>
-                <a:latin typeface="Calibri"/>
-                <a:ea typeface="Calibri"/>
-                <a:cs typeface="Calibri"/>
-                <a:sym typeface="Calibri"/>
-              </a:rPr>
-              <a:t>substation</a:t>
-            </a:r>
-            <a:r>
-              <a:rPr lang="en-US" b="0" i="0" u="none" strike="noStrike" cap="none" dirty="0">
-                <a:solidFill>
-                  <a:srgbClr val="00B0F0"/>
-                </a:solidFill>
-                <a:latin typeface="Calibri"/>
-                <a:ea typeface="Calibri"/>
-                <a:cs typeface="Calibri"/>
-                <a:sym typeface="Calibri"/>
-              </a:rPr>
-              <a:t> continuously</a:t>
-            </a:r>
-          </a:p>
-          <a:p>
-            <a:pPr marL="342900" indent="-342900">
-              <a:spcBef>
-                <a:spcPts val="600"/>
-              </a:spcBef>
-              <a:buClr>
-                <a:srgbClr val="00B0F0"/>
-              </a:buClr>
-              <a:buSzPts val="1400"/>
-              <a:buFont typeface="+mj-lt"/>
-              <a:buAutoNum type="arabicPeriod"/>
-            </a:pPr>
-            <a:r>
-              <a:rPr lang="en-US" b="0" i="0" u="none" strike="noStrike" cap="none" dirty="0">
-                <a:solidFill>
-                  <a:srgbClr val="00B0F0"/>
-                </a:solidFill>
-                <a:latin typeface="Calibri"/>
-                <a:ea typeface="Calibri"/>
-                <a:cs typeface="Calibri"/>
-                <a:sym typeface="Calibri"/>
-              </a:rPr>
-              <a:t>Left Trigger, Right Trigger &amp; B to drop in high junction from </a:t>
-            </a:r>
-            <a:r>
-              <a:rPr lang="en-US" b="0" i="0" u="none" strike="noStrike" cap="none" dirty="0">
-                <a:solidFill>
-                  <a:srgbClr val="FF0000"/>
-                </a:solidFill>
-                <a:latin typeface="Calibri"/>
-                <a:ea typeface="Calibri"/>
-                <a:cs typeface="Calibri"/>
-                <a:sym typeface="Calibri"/>
-              </a:rPr>
-              <a:t>substation</a:t>
-            </a:r>
-            <a:r>
-              <a:rPr lang="en-US" b="0" i="0" u="none" strike="noStrike" cap="none" dirty="0">
-                <a:solidFill>
-                  <a:srgbClr val="00B0F0"/>
-                </a:solidFill>
-                <a:latin typeface="Calibri"/>
-                <a:ea typeface="Calibri"/>
-                <a:cs typeface="Calibri"/>
-                <a:sym typeface="Calibri"/>
-              </a:rPr>
-              <a:t> continuously</a:t>
+              <a:t>Left Trigger &amp; X to substation pickup to drop in High Junction</a:t>
             </a:r>
           </a:p>
           <a:p>
@@ -17019,31 +16721,7 @@
                 <a:cs typeface="Calibri"/>
                 <a:sym typeface="Calibri"/>
               </a:rPr>
-              <a:t>Left Bumper, Right Bumper &amp; Y is to preset for </a:t>
-            </a:r>
-            <a:r>
-              <a:rPr lang="en-US" dirty="0">
-                <a:solidFill>
-                  <a:srgbClr val="FF0000"/>
-                </a:solidFill>
-                <a:latin typeface="Calibri"/>
-                <a:ea typeface="Calibri"/>
-                <a:cs typeface="Calibri"/>
-                <a:sym typeface="Calibri"/>
-              </a:rPr>
-              <a:t>high junction </a:t>
-            </a:r>
-            <a:r>
-              <a:rPr lang="en-US" dirty="0">
-                <a:solidFill>
-                  <a:srgbClr val="00B0F0"/>
-                </a:solidFill>
-                <a:latin typeface="Calibri"/>
-                <a:ea typeface="Calibri"/>
-                <a:cs typeface="Calibri"/>
-                <a:sym typeface="Calibri"/>
-              </a:rPr>
-              <a:t>drop</a:t>
+              <a:t>Right Trigger &amp; X to substation pickup to drop in Medium Junction</a:t>
             </a:r>
           </a:p>
           <a:p>
@@ -17068,20 +16746,21 @@
                 <a:cs typeface="Calibri"/>
                 <a:sym typeface="Calibri"/>
               </a:rPr>
-              <a:t>Left Bumper, Right Bumper &amp; B is to preset for </a:t>
+              <a:t>Left Trigger, Right Trigger &amp; X to substation pickup and ready for Navigation</a:t>
             </a:r>
-            <a:r>
-              <a:rPr lang="en-US" dirty="0">
-                <a:solidFill>
-                  <a:srgbClr val="FF0000"/>
-                </a:solidFill>
-                <a:latin typeface="Calibri"/>
-                <a:ea typeface="Calibri"/>
-                <a:cs typeface="Calibri"/>
-                <a:sym typeface="Calibri"/>
-              </a:rPr>
-              <a:t>medium junction </a:t>
-            </a:r>
+          </a:p>
+          <a:p>
+            <a:pPr marL="342900" indent="-342900">
+              <a:spcBef>
+                <a:spcPts val="600"/>
+              </a:spcBef>
+              <a:buClr>
+                <a:srgbClr val="00B0F0"/>
+              </a:buClr>
+              <a:buSzPts val="1400"/>
+              <a:buFont typeface="+mj-lt"/>
+              <a:buAutoNum type="arabicPeriod"/>
+            </a:pPr>
             <a:r>
               <a:rPr lang="en-US" dirty="0">
                 <a:solidFill>
@@ -17092,7 +16771,82 @@
                 <a:cs typeface="Calibri"/>
                 <a:sym typeface="Calibri"/>
               </a:rPr>
-              <a:t>drop</a:t>
+              <a:t>Left Bumper, Right Bumper &amp; Y is to pickup from substation and preset for high junction drop</a:t>
+            </a:r>
+          </a:p>
+          <a:p>
+            <a:pPr marL="342900" indent="-342900">
+              <a:spcBef>
+                <a:spcPts val="600"/>
+              </a:spcBef>
+              <a:buClr>
+                <a:srgbClr val="00B0F0"/>
+              </a:buClr>
+              <a:buSzPts val="1400"/>
+              <a:buFont typeface="+mj-lt"/>
+              <a:buAutoNum type="arabicPeriod"/>
+            </a:pPr>
+            <a:r>
+              <a:rPr lang="en-US" dirty="0">
+                <a:solidFill>
+                  <a:srgbClr val="00B0F0"/>
+                </a:solidFill>
+                <a:latin typeface="Calibri"/>
+                <a:ea typeface="Calibri"/>
+                <a:cs typeface="Calibri"/>
+                <a:sym typeface="Calibri"/>
+              </a:rPr>
+              <a:t>Left Trigger, Right Trigger &amp; Y is to pickup from substation and drop in high junction continuously</a:t>
+            </a:r>
+          </a:p>
+          <a:p>
+            <a:pPr marL="342900" indent="-342900">
+              <a:spcBef>
+                <a:spcPts val="600"/>
+              </a:spcBef>
+              <a:buClr>
+                <a:srgbClr val="00B0F0"/>
+              </a:buClr>
+              <a:buSzPts val="1400"/>
+              <a:buFont typeface="+mj-lt"/>
+              <a:buAutoNum type="arabicPeriod"/>
+            </a:pPr>
+            <a:r>
+              <a:rPr lang="en-US" dirty="0">
+                <a:solidFill>
+                  <a:srgbClr val="00B0F0"/>
+                </a:solidFill>
+                <a:latin typeface="Calibri"/>
+                <a:ea typeface="Calibri"/>
+                <a:cs typeface="Calibri"/>
+                <a:sym typeface="Calibri"/>
+              </a:rPr>
+              <a:t>Left Bumper, Right Bumper &amp; B is to pickup from substation and preset for medium junction drop</a:t>
+            </a:r>
+          </a:p>
+          <a:p>
+            <a:pPr marL="342900" indent="-342900">
+              <a:spcBef>
+                <a:spcPts val="600"/>
+              </a:spcBef>
+              <a:buClr>
+                <a:srgbClr val="00B0F0"/>
+              </a:buClr>
+              <a:buSzPts val="1400"/>
+              <a:buFont typeface="+mj-lt"/>
+              <a:buAutoNum type="arabicPeriod"/>
+            </a:pPr>
+            <a:r>
+              <a:rPr lang="en-US" dirty="0">
+                <a:solidFill>
+                  <a:srgbClr val="00B0F0"/>
+                </a:solidFill>
+                <a:latin typeface="Calibri"/>
+                <a:ea typeface="Calibri"/>
+                <a:cs typeface="Calibri"/>
+                <a:sym typeface="Calibri"/>
+              </a:rPr>
+              <a:t>Left Trigger, Right Trigger &amp; B is to pickup from substation and drop in medium junction continuously</a:t>
             </a:r>
           </a:p>
         </p:txBody>

</xml_diff>